<commit_message>
Presentación  de Proyecto actualizada Fase 1
</commit_message>
<xml_diff>
--- a/Fase 1/Evidencias Grupales/Presentación Proyecto.pptx
+++ b/Fase 1/Evidencias Grupales/Presentación Proyecto.pptx
@@ -4268,182 +4268,9 @@
           </a:solidFill>
         </p:spPr>
       </p:sp>
-      <p:sp>
-        <p:nvSpPr>
-          <p:cNvPr name="TextBox 3" id="3"/>
-          <p:cNvSpPr txBox="true"/>
-          <p:nvPr/>
-        </p:nvSpPr>
-        <p:spPr>
-          <a:xfrm rot="0">
-            <a:off x="2450813" y="5519253"/>
-            <a:ext cx="14318678" cy="1416050"/>
-          </a:xfrm>
-          <a:prstGeom prst="rect">
-            <a:avLst/>
-          </a:prstGeom>
-        </p:spPr>
-        <p:txBody>
-          <a:bodyPr anchor="t" rtlCol="false" tIns="0" lIns="0" bIns="0" rIns="0">
-            <a:spAutoFit/>
-          </a:bodyPr>
-          <a:lstStyle/>
-          <a:p>
-            <a:pPr algn="l" marL="0" indent="0" lvl="0">
-              <a:lnSpc>
-                <a:spcPts val="2800"/>
-              </a:lnSpc>
-            </a:pPr>
-            <a:r>
-              <a:rPr lang="en-US" sz="2000">
-                <a:solidFill>
-                  <a:srgbClr val="242424"/>
-                </a:solidFill>
-                <a:latin typeface="TT Chocolates"/>
-                <a:ea typeface="TT Chocolates"/>
-                <a:cs typeface="TT Chocolates"/>
-                <a:sym typeface="TT Chocolates"/>
-              </a:rPr>
-              <a:t>Lorem ipsum dolor sit amet, consectetur adipiscing elit, sed do eiusmod tempor incididunt ut labore et dolore magna aliqua. Ut enim ad minim veniam, quis nostrud exercitation ullamco laboris nisi ut aliquip ex ea commodo consequat. Duis aute irure dolor in reprehenderit in voluptate velit esse cillum dolore eu fugiat nulla pariatur. Excepteur sint occaecat cupidatat non proident, sunt in culpa qui officia deserunt mollit anim id est laborum.</a:t>
-            </a:r>
-          </a:p>
-        </p:txBody>
-      </p:sp>
       <p:grpSp>
         <p:nvGrpSpPr>
-          <p:cNvPr name="Group 4" id="4"/>
-          <p:cNvGrpSpPr/>
-          <p:nvPr/>
-        </p:nvGrpSpPr>
-        <p:grpSpPr>
-          <a:xfrm rot="0">
-            <a:off x="2450813" y="4297920"/>
-            <a:ext cx="14318678" cy="791414"/>
-            <a:chOff x="0" y="0"/>
-            <a:chExt cx="9537113" cy="527130"/>
-          </a:xfrm>
-        </p:grpSpPr>
-        <p:sp>
-          <p:nvSpPr>
-            <p:cNvPr name="Freeform 5" id="5"/>
-            <p:cNvSpPr/>
-            <p:nvPr/>
-          </p:nvSpPr>
-          <p:spPr>
-            <a:xfrm flipH="false" flipV="false" rot="0">
-              <a:off x="0" y="0"/>
-              <a:ext cx="9537113" cy="527130"/>
-            </a:xfrm>
-            <a:custGeom>
-              <a:avLst/>
-              <a:gdLst/>
-              <a:ahLst/>
-              <a:cxnLst/>
-              <a:rect r="r" b="b" t="t" l="l"/>
-              <a:pathLst>
-                <a:path h="527130" w="9537113">
-                  <a:moveTo>
-                    <a:pt x="0" y="0"/>
-                  </a:moveTo>
-                  <a:lnTo>
-                    <a:pt x="9537113" y="0"/>
-                  </a:lnTo>
-                  <a:lnTo>
-                    <a:pt x="9537113" y="527130"/>
-                  </a:lnTo>
-                  <a:lnTo>
-                    <a:pt x="0" y="527130"/>
-                  </a:lnTo>
-                  <a:close/>
-                </a:path>
-              </a:pathLst>
-            </a:custGeom>
-            <a:solidFill>
-              <a:srgbClr val="000000">
-                <a:alpha val="0"/>
-              </a:srgbClr>
-            </a:solidFill>
-            <a:ln w="66675" cap="sq">
-              <a:solidFill>
-                <a:srgbClr val="8FA4E1"/>
-              </a:solidFill>
-              <a:prstDash val="solid"/>
-              <a:miter/>
-            </a:ln>
-          </p:spPr>
-        </p:sp>
-        <p:sp>
-          <p:nvSpPr>
-            <p:cNvPr name="TextBox 6" id="6"/>
-            <p:cNvSpPr txBox="true"/>
-            <p:nvPr/>
-          </p:nvSpPr>
-          <p:spPr>
-            <a:xfrm>
-              <a:off x="0" y="-47625"/>
-              <a:ext cx="9537113" cy="574755"/>
-            </a:xfrm>
-            <a:prstGeom prst="rect">
-              <a:avLst/>
-            </a:prstGeom>
-          </p:spPr>
-          <p:txBody>
-            <a:bodyPr anchor="ctr" rtlCol="false" tIns="48876" lIns="48876" bIns="48876" rIns="48876"/>
-            <a:lstStyle/>
-            <a:p>
-              <a:pPr algn="ctr">
-                <a:lnSpc>
-                  <a:spcPts val="1588"/>
-                </a:lnSpc>
-              </a:pPr>
-            </a:p>
-          </p:txBody>
-        </p:sp>
-      </p:grpSp>
-      <p:sp>
-        <p:nvSpPr>
-          <p:cNvPr name="TextBox 7" id="7"/>
-          <p:cNvSpPr txBox="true"/>
-          <p:nvPr/>
-        </p:nvSpPr>
-        <p:spPr>
-          <a:xfrm rot="0">
-            <a:off x="3177027" y="4537262"/>
-            <a:ext cx="13203457" cy="331247"/>
-          </a:xfrm>
-          <a:prstGeom prst="rect">
-            <a:avLst/>
-          </a:prstGeom>
-        </p:spPr>
-        <p:txBody>
-          <a:bodyPr anchor="t" rtlCol="false" tIns="0" lIns="0" bIns="0" rIns="0">
-            <a:spAutoFit/>
-          </a:bodyPr>
-          <a:lstStyle/>
-          <a:p>
-            <a:pPr algn="l">
-              <a:lnSpc>
-                <a:spcPts val="2659"/>
-              </a:lnSpc>
-            </a:pPr>
-            <a:r>
-              <a:rPr lang="en-US" sz="2014" b="true">
-                <a:solidFill>
-                  <a:srgbClr val="1C1B19"/>
-                </a:solidFill>
-                <a:latin typeface="DM Sans Bold"/>
-                <a:ea typeface="DM Sans Bold"/>
-                <a:cs typeface="DM Sans Bold"/>
-                <a:sym typeface="DM Sans Bold"/>
-              </a:rPr>
-              <a:t>Resultados Obtenidos en el Proyecto</a:t>
-            </a:r>
-          </a:p>
-        </p:txBody>
-      </p:sp>
-      <p:grpSp>
-        <p:nvGrpSpPr>
-          <p:cNvPr name="Group 8" id="8"/>
+          <p:cNvPr name="Group 3" id="3"/>
           <p:cNvGrpSpPr/>
           <p:nvPr/>
         </p:nvGrpSpPr>
@@ -4457,7 +4284,7 @@
         </p:grpSpPr>
         <p:sp>
           <p:nvSpPr>
-            <p:cNvPr name="Freeform 9" id="9"/>
+            <p:cNvPr name="Freeform 4" id="4"/>
             <p:cNvSpPr/>
             <p:nvPr/>
           </p:nvSpPr>
@@ -4506,7 +4333,7 @@
         </p:sp>
         <p:sp>
           <p:nvSpPr>
-            <p:cNvPr name="TextBox 10" id="10"/>
+            <p:cNvPr name="TextBox 5" id="5"/>
             <p:cNvSpPr txBox="true"/>
             <p:nvPr/>
           </p:nvSpPr>
@@ -4534,7 +4361,7 @@
       </p:grpSp>
       <p:sp>
         <p:nvSpPr>
-          <p:cNvPr name="AutoShape 11" id="11"/>
+          <p:cNvPr name="AutoShape 6" id="6"/>
           <p:cNvSpPr/>
           <p:nvPr/>
         </p:nvSpPr>
@@ -4553,7 +4380,7 @@
       </p:sp>
       <p:sp>
         <p:nvSpPr>
-          <p:cNvPr name="TextBox 12" id="12"/>
+          <p:cNvPr name="TextBox 7" id="7"/>
           <p:cNvSpPr txBox="true"/>
           <p:nvPr/>
         </p:nvSpPr>
@@ -4588,47 +4415,6 @@
                 <a:sym typeface="Gill Sans Condensed"/>
               </a:rPr>
               <a:t>CONCLUSIONES</a:t>
-            </a:r>
-          </a:p>
-        </p:txBody>
-      </p:sp>
-      <p:sp>
-        <p:nvSpPr>
-          <p:cNvPr name="TextBox 13" id="13"/>
-          <p:cNvSpPr txBox="true"/>
-          <p:nvPr/>
-        </p:nvSpPr>
-        <p:spPr>
-          <a:xfrm rot="0">
-            <a:off x="2450813" y="7096406"/>
-            <a:ext cx="14318678" cy="1416050"/>
-          </a:xfrm>
-          <a:prstGeom prst="rect">
-            <a:avLst/>
-          </a:prstGeom>
-        </p:spPr>
-        <p:txBody>
-          <a:bodyPr anchor="t" rtlCol="false" tIns="0" lIns="0" bIns="0" rIns="0">
-            <a:spAutoFit/>
-          </a:bodyPr>
-          <a:lstStyle/>
-          <a:p>
-            <a:pPr algn="l" marL="0" indent="0" lvl="0">
-              <a:lnSpc>
-                <a:spcPts val="2800"/>
-              </a:lnSpc>
-            </a:pPr>
-            <a:r>
-              <a:rPr lang="en-US" sz="2000">
-                <a:solidFill>
-                  <a:srgbClr val="242424"/>
-                </a:solidFill>
-                <a:latin typeface="TT Chocolates"/>
-                <a:ea typeface="TT Chocolates"/>
-                <a:cs typeface="TT Chocolates"/>
-                <a:sym typeface="TT Chocolates"/>
-              </a:rPr>
-              <a:t>Lorem ipsum dolor sit amet, consectetur adipiscing elit, sed do eiusmod tempor incididunt ut labore et dolore magna aliqua. Ut enim ad minim veniam, quis nostrud exercitation ullamco laboris nisi ut aliquip ex ea commodo consequat. Duis aute irure dolor in reprehenderit in voluptate velit esse cillum dolore eu fugiat nulla pariatur. Excepteur sint occaecat cupidatat non proident, sunt in culpa qui officia deserunt mollit anim id est laborum.</a:t>
             </a:r>
           </a:p>
         </p:txBody>
@@ -5847,8 +5633,8 @@
         </p:nvSpPr>
         <p:spPr>
           <a:xfrm rot="0">
-            <a:off x="1953899" y="4339907"/>
-            <a:ext cx="3629069" cy="1559560"/>
+            <a:off x="1953899" y="4322589"/>
+            <a:ext cx="3550045" cy="2731800"/>
           </a:xfrm>
           <a:prstGeom prst="rect">
             <a:avLst/>
@@ -5862,11 +5648,11 @@
           <a:p>
             <a:pPr algn="ctr">
               <a:lnSpc>
-                <a:spcPts val="3499"/>
+                <a:spcPts val="3983"/>
               </a:lnSpc>
             </a:pPr>
             <a:r>
-              <a:rPr lang="en-US" b="true" sz="2499">
+              <a:rPr lang="en-US" b="true" sz="2845">
                 <a:solidFill>
                   <a:srgbClr val="242424"/>
                 </a:solidFill>
@@ -5879,15 +5665,15 @@
             </a:r>
           </a:p>
           <a:p>
-            <a:pPr algn="l" marL="453390" indent="-226695" lvl="1">
+            <a:pPr algn="l" marL="529875" indent="-264938" lvl="1">
               <a:lnSpc>
-                <a:spcPts val="2940"/>
+                <a:spcPts val="3435"/>
               </a:lnSpc>
               <a:buFont typeface="Arial"/>
               <a:buChar char="•"/>
             </a:pPr>
             <a:r>
-              <a:rPr lang="en-US" sz="2100">
+              <a:rPr lang="en-US" sz="2454">
                 <a:solidFill>
                   <a:srgbClr val="242424"/>
                 </a:solidFill>
@@ -5900,15 +5686,15 @@
             </a:r>
           </a:p>
           <a:p>
-            <a:pPr algn="l" marL="453390" indent="-226695" lvl="1">
+            <a:pPr algn="l" marL="529875" indent="-264938" lvl="1">
               <a:lnSpc>
-                <a:spcPts val="2940"/>
+                <a:spcPts val="3435"/>
               </a:lnSpc>
               <a:buFont typeface="Arial"/>
               <a:buChar char="•"/>
             </a:pPr>
             <a:r>
-              <a:rPr lang="en-US" sz="2100">
+              <a:rPr lang="en-US" sz="2454">
                 <a:solidFill>
                   <a:srgbClr val="242424"/>
                 </a:solidFill>
@@ -5923,7 +5709,7 @@
           <a:p>
             <a:pPr algn="l" marL="0" indent="0" lvl="0">
               <a:lnSpc>
-                <a:spcPts val="3079"/>
+                <a:spcPts val="3572"/>
               </a:lnSpc>
             </a:pPr>
           </a:p>
@@ -5956,8 +5742,8 @@
         </p:nvSpPr>
         <p:spPr>
           <a:xfrm rot="0">
-            <a:off x="12586425" y="3982000"/>
-            <a:ext cx="5013573" cy="2310936"/>
+            <a:off x="11877790" y="3972475"/>
+            <a:ext cx="5858619" cy="2673575"/>
           </a:xfrm>
           <a:prstGeom prst="rect">
             <a:avLst/>
@@ -5971,14 +5757,14 @@
           <a:p>
             <a:pPr algn="ctr">
               <a:lnSpc>
-                <a:spcPts val="3496"/>
+                <a:spcPts val="3980"/>
               </a:lnSpc>
               <a:spcBef>
                 <a:spcPct val="0"/>
               </a:spcBef>
             </a:pPr>
             <a:r>
-              <a:rPr lang="en-US" b="true" sz="2497">
+              <a:rPr lang="en-US" b="true" sz="2843">
                 <a:solidFill>
                   <a:srgbClr val="000000"/>
                 </a:solidFill>
@@ -5991,9 +5777,9 @@
             </a:r>
           </a:p>
           <a:p>
-            <a:pPr algn="l" marL="453390" indent="-226695" lvl="1">
+            <a:pPr algn="l" marL="529875" indent="-264938" lvl="1">
               <a:lnSpc>
-                <a:spcPts val="2940"/>
+                <a:spcPts val="3435"/>
               </a:lnSpc>
               <a:spcBef>
                 <a:spcPct val="0"/>
@@ -6002,7 +5788,7 @@
               <a:buChar char="•"/>
             </a:pPr>
             <a:r>
-              <a:rPr lang="en-US" sz="2100">
+              <a:rPr lang="en-US" sz="2454">
                 <a:solidFill>
                   <a:srgbClr val="000000"/>
                 </a:solidFill>
@@ -6015,9 +5801,9 @@
             </a:r>
           </a:p>
           <a:p>
-            <a:pPr algn="l" marL="453390" indent="-226695" lvl="1">
+            <a:pPr algn="l" marL="529875" indent="-264938" lvl="1">
               <a:lnSpc>
-                <a:spcPts val="2940"/>
+                <a:spcPts val="3435"/>
               </a:lnSpc>
               <a:spcBef>
                 <a:spcPct val="0"/>
@@ -6026,7 +5812,7 @@
               <a:buChar char="•"/>
             </a:pPr>
             <a:r>
-              <a:rPr lang="en-US" sz="2100">
+              <a:rPr lang="en-US" sz="2454">
                 <a:solidFill>
                   <a:srgbClr val="000000"/>
                 </a:solidFill>
@@ -6039,9 +5825,9 @@
             </a:r>
           </a:p>
           <a:p>
-            <a:pPr algn="l" marL="453390" indent="-226695" lvl="1">
+            <a:pPr algn="l" marL="529875" indent="-264938" lvl="1">
               <a:lnSpc>
-                <a:spcPts val="2940"/>
+                <a:spcPts val="3435"/>
               </a:lnSpc>
               <a:spcBef>
                 <a:spcPct val="0"/>
@@ -6050,7 +5836,7 @@
               <a:buChar char="•"/>
             </a:pPr>
             <a:r>
-              <a:rPr lang="en-US" sz="2100">
+              <a:rPr lang="en-US" sz="2454">
                 <a:solidFill>
                   <a:srgbClr val="000000"/>
                 </a:solidFill>
@@ -6063,9 +5849,9 @@
             </a:r>
           </a:p>
           <a:p>
-            <a:pPr algn="l" marL="453390" indent="-226695" lvl="1">
+            <a:pPr algn="l" marL="529875" indent="-264938" lvl="1">
               <a:lnSpc>
-                <a:spcPts val="2940"/>
+                <a:spcPts val="3435"/>
               </a:lnSpc>
               <a:spcBef>
                 <a:spcPct val="0"/>
@@ -6074,7 +5860,7 @@
               <a:buChar char="•"/>
             </a:pPr>
             <a:r>
-              <a:rPr lang="en-US" sz="2100">
+              <a:rPr lang="en-US" sz="2454">
                 <a:solidFill>
                   <a:srgbClr val="000000"/>
                 </a:solidFill>
@@ -6089,7 +5875,7 @@
           <a:p>
             <a:pPr algn="ctr">
               <a:lnSpc>
-                <a:spcPts val="3204"/>
+                <a:spcPts val="3694"/>
               </a:lnSpc>
               <a:spcBef>
                 <a:spcPct val="0"/>
@@ -6106,8 +5892,8 @@
         </p:nvSpPr>
         <p:spPr>
           <a:xfrm rot="0">
-            <a:off x="6172422" y="5851843"/>
-            <a:ext cx="6047673" cy="2293165"/>
+            <a:off x="6080563" y="5801601"/>
+            <a:ext cx="5915984" cy="3084401"/>
           </a:xfrm>
           <a:prstGeom prst="rect">
             <a:avLst/>
@@ -6121,14 +5907,14 @@
           <a:p>
             <a:pPr algn="ctr">
               <a:lnSpc>
-                <a:spcPts val="3493"/>
+                <a:spcPts val="3977"/>
               </a:lnSpc>
               <a:spcBef>
                 <a:spcPct val="0"/>
               </a:spcBef>
             </a:pPr>
             <a:r>
-              <a:rPr lang="en-US" b="true" sz="2495">
+              <a:rPr lang="en-US" b="true" sz="2840">
                 <a:solidFill>
                   <a:srgbClr val="000000"/>
                 </a:solidFill>
@@ -6140,7 +5926,7 @@
               <a:t>Fac</a:t>
             </a:r>
             <a:r>
-              <a:rPr lang="en-US" b="true" sz="2495">
+              <a:rPr lang="en-US" b="true" sz="2840">
                 <a:solidFill>
                   <a:srgbClr val="000000"/>
                 </a:solidFill>
@@ -6153,9 +5939,9 @@
             </a:r>
           </a:p>
           <a:p>
-            <a:pPr algn="l" marL="452371" indent="-226186" lvl="1">
+            <a:pPr algn="l" marL="528879" indent="-264440" lvl="1">
               <a:lnSpc>
-                <a:spcPts val="2933"/>
+                <a:spcPts val="3429"/>
               </a:lnSpc>
               <a:spcBef>
                 <a:spcPct val="0"/>
@@ -6164,7 +5950,7 @@
               <a:buChar char="•"/>
             </a:pPr>
             <a:r>
-              <a:rPr lang="en-US" sz="2095">
+              <a:rPr lang="en-US" sz="2449">
                 <a:solidFill>
                   <a:srgbClr val="000000"/>
                 </a:solidFill>
@@ -6176,7 +5962,7 @@
               <a:t>Tim</a:t>
             </a:r>
             <a:r>
-              <a:rPr lang="en-US" sz="2095">
+              <a:rPr lang="en-US" sz="2449">
                 <a:solidFill>
                   <a:srgbClr val="000000"/>
                 </a:solidFill>
@@ -6189,9 +5975,9 @@
             </a:r>
           </a:p>
           <a:p>
-            <a:pPr algn="l" marL="452371" indent="-226186" lvl="1">
+            <a:pPr algn="l" marL="528879" indent="-264440" lvl="1">
               <a:lnSpc>
-                <a:spcPts val="2933"/>
+                <a:spcPts val="3429"/>
               </a:lnSpc>
               <a:spcBef>
                 <a:spcPct val="0"/>
@@ -6200,7 +5986,7 @@
               <a:buChar char="•"/>
             </a:pPr>
             <a:r>
-              <a:rPr lang="en-US" sz="2095">
+              <a:rPr lang="en-US" sz="2449">
                 <a:solidFill>
                   <a:srgbClr val="000000"/>
                 </a:solidFill>
@@ -6212,7 +5998,7 @@
               <a:t>🏪 </a:t>
             </a:r>
             <a:r>
-              <a:rPr lang="en-US" sz="2095">
+              <a:rPr lang="en-US" sz="2449">
                 <a:solidFill>
                   <a:srgbClr val="000000"/>
                 </a:solidFill>
@@ -6225,9 +6011,9 @@
             </a:r>
           </a:p>
           <a:p>
-            <a:pPr algn="l" marL="452371" indent="-226186" lvl="1">
+            <a:pPr algn="l" marL="528879" indent="-264440" lvl="1">
               <a:lnSpc>
-                <a:spcPts val="2933"/>
+                <a:spcPts val="3429"/>
               </a:lnSpc>
               <a:spcBef>
                 <a:spcPct val="0"/>
@@ -6236,7 +6022,7 @@
               <a:buChar char="•"/>
             </a:pPr>
             <a:r>
-              <a:rPr lang="en-US" sz="2095">
+              <a:rPr lang="en-US" sz="2449">
                 <a:solidFill>
                   <a:srgbClr val="000000"/>
                 </a:solidFill>
@@ -6249,9 +6035,9 @@
             </a:r>
           </a:p>
           <a:p>
-            <a:pPr algn="l" marL="452371" indent="-226186" lvl="1">
+            <a:pPr algn="l" marL="528879" indent="-264440" lvl="1">
               <a:lnSpc>
-                <a:spcPts val="2933"/>
+                <a:spcPts val="3429"/>
               </a:lnSpc>
               <a:spcBef>
                 <a:spcPct val="0"/>
@@ -6260,7 +6046,7 @@
               <a:buChar char="•"/>
             </a:pPr>
             <a:r>
-              <a:rPr lang="en-US" sz="2095">
+              <a:rPr lang="en-US" sz="2449">
                 <a:solidFill>
                   <a:srgbClr val="000000"/>
                 </a:solidFill>
@@ -6275,7 +6061,7 @@
           <a:p>
             <a:pPr algn="ctr">
               <a:lnSpc>
-                <a:spcPts val="3066"/>
+                <a:spcPts val="3559"/>
               </a:lnSpc>
               <a:spcBef>
                 <a:spcPct val="0"/>

</xml_diff>